<commit_message>
Image and dashboard changes
</commit_message>
<xml_diff>
--- a/CombinedAddressability.pptx
+++ b/CombinedAddressability.pptx
@@ -5,10 +5,10 @@
     <p:sldMasterId id="2147483648" r:id="rId1"/>
   </p:sldMasterIdLst>
   <p:notesMasterIdLst>
-    <p:notesMasterId r:id="rId11"/>
+    <p:notesMasterId r:id="rId14"/>
   </p:notesMasterIdLst>
   <p:handoutMasterIdLst>
-    <p:handoutMasterId r:id="rId12"/>
+    <p:handoutMasterId r:id="rId15"/>
   </p:handoutMasterIdLst>
   <p:sldIdLst>
     <p:sldId id="309" r:id="rId2"/>
@@ -19,7 +19,10 @@
     <p:sldId id="313" r:id="rId7"/>
     <p:sldId id="314" r:id="rId8"/>
     <p:sldId id="315" r:id="rId9"/>
-    <p:sldId id="307" r:id="rId10"/>
+    <p:sldId id="317" r:id="rId10"/>
+    <p:sldId id="316" r:id="rId11"/>
+    <p:sldId id="318" r:id="rId12"/>
+    <p:sldId id="319" r:id="rId13"/>
   </p:sldIdLst>
   <p:sldSz cx="12192000" cy="6858000"/>
   <p:notesSz cx="6858000" cy="9144000"/>
@@ -275,7 +278,7 @@
             <a:fld id="{0E143355-DBAB-A149-92FF-7A0A2302F2EE}" type="datetimeFigureOut">
               <a:rPr lang="en-US" altLang="en-US"/>
               <a:pPr/>
-              <a:t>10/11/17</a:t>
+              <a:t>10/17/17</a:t>
             </a:fld>
             <a:endParaRPr lang="en-US" altLang="en-US"/>
           </a:p>
@@ -456,7 +459,7 @@
             <a:fld id="{1E2B973D-A907-6347-9B89-FE2620A4B941}" type="datetimeFigureOut">
               <a:rPr lang="en-US" altLang="en-US"/>
               <a:pPr/>
-              <a:t>10/11/17</a:t>
+              <a:t>10/17/17</a:t>
             </a:fld>
             <a:endParaRPr lang="en-US" altLang="en-US"/>
           </a:p>
@@ -756,278 +759,6 @@
     </a:lvl9pPr>
   </p:notesStyle>
 </p:notesMaster>
-</file>
-
-<file path=ppt/notesSlides/notesSlide1.xml><?xml version="1.0" encoding="utf-8"?>
-<p:notes xmlns:a="http://schemas.openxmlformats.org/drawingml/2006/main" xmlns:r="http://schemas.openxmlformats.org/officeDocument/2006/relationships" xmlns:p="http://schemas.openxmlformats.org/presentationml/2006/main">
-  <p:cSld>
-    <p:spTree>
-      <p:nvGrpSpPr>
-        <p:cNvPr id="1" name=""/>
-        <p:cNvGrpSpPr/>
-        <p:nvPr/>
-      </p:nvGrpSpPr>
-      <p:grpSpPr>
-        <a:xfrm>
-          <a:off x="0" y="0"/>
-          <a:ext cx="0" cy="0"/>
-          <a:chOff x="0" y="0"/>
-          <a:chExt cx="0" cy="0"/>
-        </a:xfrm>
-      </p:grpSpPr>
-      <p:sp>
-        <p:nvSpPr>
-          <p:cNvPr id="13313" name="Slide Image Placeholder 1"/>
-          <p:cNvSpPr>
-            <a:spLocks noGrp="1" noRot="1" noChangeAspect="1" noTextEdit="1"/>
-          </p:cNvSpPr>
-          <p:nvPr>
-            <p:ph type="sldImg"/>
-          </p:nvPr>
-        </p:nvSpPr>
-        <p:spPr bwMode="auto">
-          <a:noFill/>
-          <a:ln>
-            <a:solidFill>
-              <a:srgbClr val="000000"/>
-            </a:solidFill>
-            <a:miter lim="800000"/>
-            <a:headEnd/>
-            <a:tailEnd/>
-          </a:ln>
-          <a:extLst>
-            <a:ext uri="{909E8E84-426E-40DD-AFC4-6F175D3DCCD1}">
-              <a14:hiddenFill xmlns:a14="http://schemas.microsoft.com/office/drawing/2010/main">
-                <a:solidFill>
-                  <a:srgbClr val="FFFFFF"/>
-                </a:solidFill>
-              </a14:hiddenFill>
-            </a:ext>
-            <a:ext uri="{FAA26D3D-D897-4be2-8F04-BA451C77F1D7}">
-              <ma14:placeholderFlag xmlns:ma14="http://schemas.microsoft.com/office/mac/drawingml/2011/main" val="1"/>
-            </a:ext>
-          </a:extLst>
-        </p:spPr>
-      </p:sp>
-      <p:sp>
-        <p:nvSpPr>
-          <p:cNvPr id="13314" name="Notes Placeholder 2"/>
-          <p:cNvSpPr>
-            <a:spLocks noGrp="1"/>
-          </p:cNvSpPr>
-          <p:nvPr>
-            <p:ph type="body" idx="1"/>
-          </p:nvPr>
-        </p:nvSpPr>
-        <p:spPr bwMode="auto">
-          <a:noFill/>
-          <a:extLst>
-            <a:ext uri="{909E8E84-426E-40DD-AFC4-6F175D3DCCD1}">
-              <a14:hiddenFill xmlns:a14="http://schemas.microsoft.com/office/drawing/2010/main">
-                <a:solidFill>
-                  <a:srgbClr val="FFFFFF"/>
-                </a:solidFill>
-              </a14:hiddenFill>
-            </a:ext>
-            <a:ext uri="{91240B29-F687-4F45-9708-019B960494DF}">
-              <a14:hiddenLine xmlns:a14="http://schemas.microsoft.com/office/drawing/2010/main" w="9525">
-                <a:solidFill>
-                  <a:srgbClr val="000000"/>
-                </a:solidFill>
-                <a:miter lim="800000"/>
-                <a:headEnd/>
-                <a:tailEnd/>
-              </a14:hiddenLine>
-            </a:ext>
-            <a:ext uri="{FAA26D3D-D897-4be2-8F04-BA451C77F1D7}">
-              <ma14:placeholderFlag xmlns:ma14="http://schemas.microsoft.com/office/mac/drawingml/2011/main" val="1"/>
-            </a:ext>
-          </a:extLst>
-        </p:spPr>
-        <p:txBody>
-          <a:bodyPr wrap="square" numCol="1" anchor="t" anchorCtr="0" compatLnSpc="1">
-            <a:prstTxWarp prst="textNoShape">
-              <a:avLst/>
-            </a:prstTxWarp>
-          </a:bodyPr>
-          <a:lstStyle/>
-          <a:p>
-            <a:endParaRPr lang="en-US" altLang="en-US"/>
-          </a:p>
-        </p:txBody>
-      </p:sp>
-      <p:sp>
-        <p:nvSpPr>
-          <p:cNvPr id="13315" name="Slide Number Placeholder 3"/>
-          <p:cNvSpPr>
-            <a:spLocks noGrp="1"/>
-          </p:cNvSpPr>
-          <p:nvPr>
-            <p:ph type="sldNum" sz="quarter" idx="5"/>
-          </p:nvPr>
-        </p:nvSpPr>
-        <p:spPr bwMode="auto">
-          <a:noFill/>
-          <a:extLst>
-            <a:ext uri="{909E8E84-426E-40DD-AFC4-6F175D3DCCD1}">
-              <a14:hiddenFill xmlns:a14="http://schemas.microsoft.com/office/drawing/2010/main">
-                <a:solidFill>
-                  <a:srgbClr val="FFFFFF"/>
-                </a:solidFill>
-              </a14:hiddenFill>
-            </a:ext>
-            <a:ext uri="{91240B29-F687-4F45-9708-019B960494DF}">
-              <a14:hiddenLine xmlns:a14="http://schemas.microsoft.com/office/drawing/2010/main" w="9525">
-                <a:solidFill>
-                  <a:srgbClr val="000000"/>
-                </a:solidFill>
-                <a:miter lim="800000"/>
-                <a:headEnd/>
-                <a:tailEnd/>
-              </a14:hiddenLine>
-            </a:ext>
-          </a:extLst>
-        </p:spPr>
-        <p:txBody>
-          <a:bodyPr/>
-          <a:lstStyle>
-            <a:lvl1pPr>
-              <a:spcBef>
-                <a:spcPct val="30000"/>
-              </a:spcBef>
-              <a:defRPr sz="1200">
-                <a:solidFill>
-                  <a:schemeClr val="tx1"/>
-                </a:solidFill>
-                <a:latin typeface="Calibri" charset="0"/>
-              </a:defRPr>
-            </a:lvl1pPr>
-            <a:lvl2pPr marL="742950" indent="-285750">
-              <a:spcBef>
-                <a:spcPct val="30000"/>
-              </a:spcBef>
-              <a:defRPr sz="1200">
-                <a:solidFill>
-                  <a:schemeClr val="tx1"/>
-                </a:solidFill>
-                <a:latin typeface="Calibri" charset="0"/>
-              </a:defRPr>
-            </a:lvl2pPr>
-            <a:lvl3pPr marL="1143000" indent="-228600">
-              <a:spcBef>
-                <a:spcPct val="30000"/>
-              </a:spcBef>
-              <a:defRPr sz="1200">
-                <a:solidFill>
-                  <a:schemeClr val="tx1"/>
-                </a:solidFill>
-                <a:latin typeface="Calibri" charset="0"/>
-              </a:defRPr>
-            </a:lvl3pPr>
-            <a:lvl4pPr marL="1600200" indent="-228600">
-              <a:spcBef>
-                <a:spcPct val="30000"/>
-              </a:spcBef>
-              <a:defRPr sz="1200">
-                <a:solidFill>
-                  <a:schemeClr val="tx1"/>
-                </a:solidFill>
-                <a:latin typeface="Calibri" charset="0"/>
-              </a:defRPr>
-            </a:lvl4pPr>
-            <a:lvl5pPr marL="2057400" indent="-228600">
-              <a:spcBef>
-                <a:spcPct val="30000"/>
-              </a:spcBef>
-              <a:defRPr sz="1200">
-                <a:solidFill>
-                  <a:schemeClr val="tx1"/>
-                </a:solidFill>
-                <a:latin typeface="Calibri" charset="0"/>
-              </a:defRPr>
-            </a:lvl5pPr>
-            <a:lvl6pPr marL="2514600" indent="-228600" eaLnBrk="0" fontAlgn="base" hangingPunct="0">
-              <a:spcBef>
-                <a:spcPct val="30000"/>
-              </a:spcBef>
-              <a:spcAft>
-                <a:spcPct val="0"/>
-              </a:spcAft>
-              <a:defRPr sz="1200">
-                <a:solidFill>
-                  <a:schemeClr val="tx1"/>
-                </a:solidFill>
-                <a:latin typeface="Calibri" charset="0"/>
-              </a:defRPr>
-            </a:lvl6pPr>
-            <a:lvl7pPr marL="2971800" indent="-228600" eaLnBrk="0" fontAlgn="base" hangingPunct="0">
-              <a:spcBef>
-                <a:spcPct val="30000"/>
-              </a:spcBef>
-              <a:spcAft>
-                <a:spcPct val="0"/>
-              </a:spcAft>
-              <a:defRPr sz="1200">
-                <a:solidFill>
-                  <a:schemeClr val="tx1"/>
-                </a:solidFill>
-                <a:latin typeface="Calibri" charset="0"/>
-              </a:defRPr>
-            </a:lvl7pPr>
-            <a:lvl8pPr marL="3429000" indent="-228600" eaLnBrk="0" fontAlgn="base" hangingPunct="0">
-              <a:spcBef>
-                <a:spcPct val="30000"/>
-              </a:spcBef>
-              <a:spcAft>
-                <a:spcPct val="0"/>
-              </a:spcAft>
-              <a:defRPr sz="1200">
-                <a:solidFill>
-                  <a:schemeClr val="tx1"/>
-                </a:solidFill>
-                <a:latin typeface="Calibri" charset="0"/>
-              </a:defRPr>
-            </a:lvl8pPr>
-            <a:lvl9pPr marL="3886200" indent="-228600" eaLnBrk="0" fontAlgn="base" hangingPunct="0">
-              <a:spcBef>
-                <a:spcPct val="30000"/>
-              </a:spcBef>
-              <a:spcAft>
-                <a:spcPct val="0"/>
-              </a:spcAft>
-              <a:defRPr sz="1200">
-                <a:solidFill>
-                  <a:schemeClr val="tx1"/>
-                </a:solidFill>
-                <a:latin typeface="Calibri" charset="0"/>
-              </a:defRPr>
-            </a:lvl9pPr>
-          </a:lstStyle>
-          <a:p>
-            <a:pPr>
-              <a:spcBef>
-                <a:spcPct val="0"/>
-              </a:spcBef>
-            </a:pPr>
-            <a:fld id="{35C478F0-F5DB-D041-A8BE-845845749E78}" type="slidenum">
-              <a:rPr lang="en-US" altLang="en-US"/>
-              <a:pPr>
-                <a:spcBef>
-                  <a:spcPct val="0"/>
-                </a:spcBef>
-              </a:pPr>
-              <a:t>9</a:t>
-            </a:fld>
-            <a:endParaRPr lang="en-US" altLang="en-US"/>
-          </a:p>
-        </p:txBody>
-      </p:sp>
-    </p:spTree>
-  </p:cSld>
-  <p:clrMapOvr>
-    <a:masterClrMapping/>
-  </p:clrMapOvr>
-</p:notes>
 </file>
 
 <file path=ppt/slideLayouts/slideLayout1.xml><?xml version="1.0" encoding="utf-8"?>
@@ -4050,6 +3781,407 @@
 </p:sld>
 </file>
 
+<file path=ppt/slides/slide10.xml><?xml version="1.0" encoding="utf-8"?>
+<p:sld xmlns:a="http://schemas.openxmlformats.org/drawingml/2006/main" xmlns:r="http://schemas.openxmlformats.org/officeDocument/2006/relationships" xmlns:p="http://schemas.openxmlformats.org/presentationml/2006/main">
+  <p:cSld>
+    <p:spTree>
+      <p:nvGrpSpPr>
+        <p:cNvPr id="1" name=""/>
+        <p:cNvGrpSpPr/>
+        <p:nvPr/>
+      </p:nvGrpSpPr>
+      <p:grpSpPr>
+        <a:xfrm>
+          <a:off x="0" y="0"/>
+          <a:ext cx="0" cy="0"/>
+          <a:chOff x="0" y="0"/>
+          <a:chExt cx="0" cy="0"/>
+        </a:xfrm>
+      </p:grpSpPr>
+      <p:sp>
+        <p:nvSpPr>
+          <p:cNvPr id="2" name="Title 1"/>
+          <p:cNvSpPr>
+            <a:spLocks noGrp="1"/>
+          </p:cNvSpPr>
+          <p:nvPr>
+            <p:ph type="title"/>
+          </p:nvPr>
+        </p:nvSpPr>
+        <p:spPr/>
+        <p:txBody>
+          <a:bodyPr/>
+          <a:lstStyle/>
+          <a:p>
+            <a:r>
+              <a:rPr lang="en-US" dirty="0" smtClean="0"/>
+              <a:t>BIC Addressability Comparison</a:t>
+            </a:r>
+            <a:endParaRPr lang="en-US" dirty="0"/>
+          </a:p>
+        </p:txBody>
+      </p:sp>
+      <p:pic>
+        <p:nvPicPr>
+          <p:cNvPr id="6" name="Picture 5"/>
+          <p:cNvPicPr>
+            <a:picLocks noChangeAspect="1"/>
+          </p:cNvPicPr>
+          <p:nvPr/>
+        </p:nvPicPr>
+        <p:blipFill>
+          <a:blip r:embed="rId2">
+            <a:extLst>
+              <a:ext uri="{28A0092B-C50C-407E-A947-70E740481C1C}">
+                <a14:useLocalDpi xmlns:a14="http://schemas.microsoft.com/office/drawing/2010/main" val="0"/>
+              </a:ext>
+            </a:extLst>
+          </a:blip>
+          <a:stretch>
+            <a:fillRect/>
+          </a:stretch>
+        </p:blipFill>
+        <p:spPr>
+          <a:xfrm>
+            <a:off x="4325669" y="1231693"/>
+            <a:ext cx="7554521" cy="4647740"/>
+          </a:xfrm>
+          <a:prstGeom prst="rect">
+            <a:avLst/>
+          </a:prstGeom>
+        </p:spPr>
+      </p:pic>
+      <p:sp>
+        <p:nvSpPr>
+          <p:cNvPr id="7" name="TextBox 6"/>
+          <p:cNvSpPr txBox="1"/>
+          <p:nvPr/>
+        </p:nvSpPr>
+        <p:spPr>
+          <a:xfrm>
+            <a:off x="154380" y="1733797"/>
+            <a:ext cx="4122924" cy="2862322"/>
+          </a:xfrm>
+          <a:prstGeom prst="rect">
+            <a:avLst/>
+          </a:prstGeom>
+          <a:noFill/>
+        </p:spPr>
+        <p:txBody>
+          <a:bodyPr wrap="square" rtlCol="0">
+            <a:spAutoFit/>
+          </a:bodyPr>
+          <a:lstStyle/>
+          <a:p>
+            <a:r>
+              <a:rPr lang="en-US" dirty="0" smtClean="0"/>
+              <a:t>Observations:</a:t>
+            </a:r>
+          </a:p>
+          <a:p>
+            <a:pPr marL="285750" indent="-285750">
+              <a:buFont typeface="Arial" charset="0"/>
+              <a:buChar char="•"/>
+            </a:pPr>
+            <a:r>
+              <a:rPr lang="en-US" dirty="0" smtClean="0"/>
+              <a:t>IT contracts impacted by prior addressability flaw.</a:t>
+            </a:r>
+          </a:p>
+          <a:p>
+            <a:pPr marL="742950" lvl="1" indent="-285750">
+              <a:buFont typeface="Arial" charset="0"/>
+              <a:buChar char="•"/>
+            </a:pPr>
+            <a:r>
+              <a:rPr lang="en-US" dirty="0" smtClean="0"/>
+              <a:t>New method corrects</a:t>
+            </a:r>
+          </a:p>
+          <a:p>
+            <a:pPr marL="285750" indent="-285750">
+              <a:buFont typeface="Arial" charset="0"/>
+              <a:buChar char="•"/>
+            </a:pPr>
+            <a:r>
+              <a:rPr lang="en-US" dirty="0" smtClean="0"/>
+              <a:t>DLA Fuels anomalous. More investigation required.</a:t>
+            </a:r>
+          </a:p>
+          <a:p>
+            <a:pPr marL="285750" indent="-285750">
+              <a:buFont typeface="Arial" charset="0"/>
+              <a:buChar char="•"/>
+            </a:pPr>
+            <a:r>
+              <a:rPr lang="en-US" dirty="0" smtClean="0"/>
+              <a:t>Conjecture that FSSI Wireless requires further constraint based on </a:t>
+            </a:r>
+            <a:r>
+              <a:rPr lang="en-US" dirty="0" err="1" smtClean="0"/>
+              <a:t>reference_piid</a:t>
+            </a:r>
+            <a:r>
+              <a:rPr lang="en-US" dirty="0" smtClean="0"/>
+              <a:t>. </a:t>
+            </a:r>
+          </a:p>
+          <a:p>
+            <a:endParaRPr lang="en-US" dirty="0"/>
+          </a:p>
+        </p:txBody>
+      </p:sp>
+    </p:spTree>
+    <p:extLst>
+      <p:ext uri="{BB962C8B-B14F-4D97-AF65-F5344CB8AC3E}">
+        <p14:creationId xmlns:p14="http://schemas.microsoft.com/office/powerpoint/2010/main" val="870229507"/>
+      </p:ext>
+    </p:extLst>
+  </p:cSld>
+  <p:clrMapOvr>
+    <a:masterClrMapping/>
+  </p:clrMapOvr>
+</p:sld>
+</file>
+
+<file path=ppt/slides/slide11.xml><?xml version="1.0" encoding="utf-8"?>
+<p:sld xmlns:a="http://schemas.openxmlformats.org/drawingml/2006/main" xmlns:r="http://schemas.openxmlformats.org/officeDocument/2006/relationships" xmlns:p="http://schemas.openxmlformats.org/presentationml/2006/main">
+  <p:cSld>
+    <p:spTree>
+      <p:nvGrpSpPr>
+        <p:cNvPr id="1" name=""/>
+        <p:cNvGrpSpPr/>
+        <p:nvPr/>
+      </p:nvGrpSpPr>
+      <p:grpSpPr>
+        <a:xfrm>
+          <a:off x="0" y="0"/>
+          <a:ext cx="0" cy="0"/>
+          <a:chOff x="0" y="0"/>
+          <a:chExt cx="0" cy="0"/>
+        </a:xfrm>
+      </p:grpSpPr>
+      <p:sp>
+        <p:nvSpPr>
+          <p:cNvPr id="2" name="Title 1"/>
+          <p:cNvSpPr>
+            <a:spLocks noGrp="1"/>
+          </p:cNvSpPr>
+          <p:nvPr>
+            <p:ph type="title"/>
+          </p:nvPr>
+        </p:nvSpPr>
+        <p:spPr/>
+        <p:txBody>
+          <a:bodyPr/>
+          <a:lstStyle/>
+          <a:p>
+            <a:r>
+              <a:rPr lang="en-US" dirty="0" smtClean="0"/>
+              <a:t>GSA Addressability vs Obligations	</a:t>
+            </a:r>
+            <a:endParaRPr lang="en-US" dirty="0"/>
+          </a:p>
+        </p:txBody>
+      </p:sp>
+      <p:pic>
+        <p:nvPicPr>
+          <p:cNvPr id="4" name="Picture 3"/>
+          <p:cNvPicPr>
+            <a:picLocks noChangeAspect="1"/>
+          </p:cNvPicPr>
+          <p:nvPr/>
+        </p:nvPicPr>
+        <p:blipFill>
+          <a:blip r:embed="rId2">
+            <a:extLst>
+              <a:ext uri="{28A0092B-C50C-407E-A947-70E740481C1C}">
+                <a14:useLocalDpi xmlns:a14="http://schemas.microsoft.com/office/drawing/2010/main" val="0"/>
+              </a:ext>
+            </a:extLst>
+          </a:blip>
+          <a:stretch>
+            <a:fillRect/>
+          </a:stretch>
+        </p:blipFill>
+        <p:spPr>
+          <a:xfrm>
+            <a:off x="0" y="1574800"/>
+            <a:ext cx="11934702" cy="4160982"/>
+          </a:xfrm>
+          <a:prstGeom prst="rect">
+            <a:avLst/>
+          </a:prstGeom>
+        </p:spPr>
+      </p:pic>
+    </p:spTree>
+    <p:extLst>
+      <p:ext uri="{BB962C8B-B14F-4D97-AF65-F5344CB8AC3E}">
+        <p14:creationId xmlns:p14="http://schemas.microsoft.com/office/powerpoint/2010/main" val="1272098265"/>
+      </p:ext>
+    </p:extLst>
+  </p:cSld>
+  <p:clrMapOvr>
+    <a:masterClrMapping/>
+  </p:clrMapOvr>
+</p:sld>
+</file>
+
+<file path=ppt/slides/slide12.xml><?xml version="1.0" encoding="utf-8"?>
+<p:sld xmlns:a="http://schemas.openxmlformats.org/drawingml/2006/main" xmlns:r="http://schemas.openxmlformats.org/officeDocument/2006/relationships" xmlns:p="http://schemas.openxmlformats.org/presentationml/2006/main">
+  <p:cSld>
+    <p:spTree>
+      <p:nvGrpSpPr>
+        <p:cNvPr id="1" name=""/>
+        <p:cNvGrpSpPr/>
+        <p:nvPr/>
+      </p:nvGrpSpPr>
+      <p:grpSpPr>
+        <a:xfrm>
+          <a:off x="0" y="0"/>
+          <a:ext cx="0" cy="0"/>
+          <a:chOff x="0" y="0"/>
+          <a:chExt cx="0" cy="0"/>
+        </a:xfrm>
+      </p:grpSpPr>
+      <p:sp>
+        <p:nvSpPr>
+          <p:cNvPr id="20481" name="Title 1"/>
+          <p:cNvSpPr>
+            <a:spLocks noGrp="1"/>
+          </p:cNvSpPr>
+          <p:nvPr>
+            <p:ph type="title"/>
+          </p:nvPr>
+        </p:nvSpPr>
+        <p:spPr/>
+        <p:txBody>
+          <a:bodyPr/>
+          <a:lstStyle/>
+          <a:p>
+            <a:r>
+              <a:rPr lang="en-US" altLang="en-US" dirty="0" smtClean="0">
+                <a:latin typeface="Arial" charset="0"/>
+                <a:cs typeface="Arial" charset="0"/>
+              </a:rPr>
+              <a:t>Agency/Bureau Level Addressability</a:t>
+            </a:r>
+            <a:endParaRPr lang="en-US" altLang="en-US" dirty="0">
+              <a:latin typeface="Arial" charset="0"/>
+              <a:cs typeface="Arial" charset="0"/>
+            </a:endParaRPr>
+          </a:p>
+        </p:txBody>
+      </p:sp>
+      <p:pic>
+        <p:nvPicPr>
+          <p:cNvPr id="2" name="Picture 1"/>
+          <p:cNvPicPr>
+            <a:picLocks noChangeAspect="1"/>
+          </p:cNvPicPr>
+          <p:nvPr/>
+        </p:nvPicPr>
+        <p:blipFill>
+          <a:blip r:embed="rId2">
+            <a:extLst>
+              <a:ext uri="{28A0092B-C50C-407E-A947-70E740481C1C}">
+                <a14:useLocalDpi xmlns:a14="http://schemas.microsoft.com/office/drawing/2010/main" val="0"/>
+              </a:ext>
+            </a:extLst>
+          </a:blip>
+          <a:stretch>
+            <a:fillRect/>
+          </a:stretch>
+        </p:blipFill>
+        <p:spPr>
+          <a:xfrm>
+            <a:off x="1151536" y="1239128"/>
+            <a:ext cx="9431520" cy="4562065"/>
+          </a:xfrm>
+          <a:prstGeom prst="rect">
+            <a:avLst/>
+          </a:prstGeom>
+        </p:spPr>
+      </p:pic>
+      <p:sp>
+        <p:nvSpPr>
+          <p:cNvPr id="3" name="Rectangle 2"/>
+          <p:cNvSpPr/>
+          <p:nvPr/>
+        </p:nvSpPr>
+        <p:spPr>
+          <a:xfrm>
+            <a:off x="3847606" y="3075710"/>
+            <a:ext cx="1284575" cy="1107996"/>
+          </a:xfrm>
+          <a:prstGeom prst="rect">
+            <a:avLst/>
+          </a:prstGeom>
+          <a:noFill/>
+        </p:spPr>
+        <p:txBody>
+          <a:bodyPr wrap="square" lIns="91440" tIns="45720" rIns="91440" bIns="45720">
+            <a:spAutoFit/>
+          </a:bodyPr>
+          <a:lstStyle/>
+          <a:p>
+            <a:pPr algn="ctr"/>
+            <a:r>
+              <a:rPr lang="en-US" sz="6600" b="1" cap="none" spc="0" dirty="0" smtClean="0">
+                <a:ln w="22225">
+                  <a:solidFill>
+                    <a:schemeClr val="accent2"/>
+                  </a:solidFill>
+                  <a:prstDash val="solid"/>
+                </a:ln>
+                <a:solidFill>
+                  <a:schemeClr val="accent2">
+                    <a:lumMod val="40000"/>
+                    <a:lumOff val="60000"/>
+                  </a:schemeClr>
+                </a:solidFill>
+                <a:effectLst/>
+              </a:rPr>
+              <a:t>X</a:t>
+            </a:r>
+            <a:endParaRPr lang="en-US" sz="6600" b="1" cap="none" spc="0" dirty="0">
+              <a:ln w="22225">
+                <a:solidFill>
+                  <a:schemeClr val="accent2"/>
+                </a:solidFill>
+                <a:prstDash val="solid"/>
+              </a:ln>
+              <a:solidFill>
+                <a:schemeClr val="accent2">
+                  <a:lumMod val="40000"/>
+                  <a:lumOff val="60000"/>
+                </a:schemeClr>
+              </a:solidFill>
+              <a:effectLst/>
+            </a:endParaRPr>
+          </a:p>
+        </p:txBody>
+      </p:sp>
+    </p:spTree>
+    <p:extLst>
+      <p:ext uri="{BB962C8B-B14F-4D97-AF65-F5344CB8AC3E}">
+        <p14:creationId xmlns:p14="http://schemas.microsoft.com/office/powerpoint/2010/main" val="815903818"/>
+      </p:ext>
+    </p:extLst>
+  </p:cSld>
+  <p:clrMapOvr>
+    <a:masterClrMapping/>
+  </p:clrMapOvr>
+  <p:timing>
+    <p:tnLst>
+      <p:par>
+        <p:cTn id="1" dur="indefinite" restart="never" nodeType="tmRoot"/>
+      </p:par>
+    </p:tnLst>
+  </p:timing>
+</p:sld>
+</file>
+
 <file path=ppt/slides/slide2.xml><?xml version="1.0" encoding="utf-8"?>
 <p:sld xmlns:a="http://schemas.openxmlformats.org/drawingml/2006/main" xmlns:r="http://schemas.openxmlformats.org/officeDocument/2006/relationships" xmlns:p="http://schemas.openxmlformats.org/presentationml/2006/main">
   <p:cSld>
@@ -5105,13 +5237,18 @@
             <p:ph idx="1"/>
           </p:nvPr>
         </p:nvSpPr>
-        <p:spPr/>
+        <p:spPr>
+          <a:xfrm>
+            <a:off x="838200" y="1203694"/>
+            <a:ext cx="10515600" cy="4414838"/>
+          </a:xfrm>
+        </p:spPr>
         <p:txBody>
           <a:bodyPr/>
           <a:lstStyle/>
           <a:p>
             <a:r>
-              <a:rPr lang="en-US" sz="2400" dirty="0" smtClean="0"/>
+              <a:rPr lang="en-US" sz="2000" dirty="0" smtClean="0"/>
               <a:t>Use-Case: When using PSC/NAICS as the only FPDS coding attributes, erroneous addressability signatures can be introduced.</a:t>
             </a:r>
           </a:p>
@@ -5131,7 +5268,7 @@
           </a:p>
           <a:p>
             <a:r>
-              <a:rPr lang="en-US" sz="2400" dirty="0" smtClean="0"/>
+              <a:rPr lang="en-US" sz="2000" dirty="0" smtClean="0"/>
               <a:t>Alternatives:</a:t>
             </a:r>
           </a:p>
@@ -5184,7 +5321,7 @@
             </a:r>
             <a:r>
               <a:rPr lang="en-US" sz="2400" dirty="0" smtClean="0"/>
-              <a:t>time </a:t>
+              <a:t>times </a:t>
             </a:r>
             <a:r>
               <a:rPr lang="en-US" sz="1800" dirty="0" smtClean="0"/>
@@ -5203,12 +5340,8 @@
               <a:t>naics</a:t>
             </a:r>
             <a:r>
-              <a:rPr lang="en-US" sz="1800" smtClean="0"/>
-              <a:t>, </a:t>
-            </a:r>
-            <a:r>
               <a:rPr lang="en-US" sz="1800" dirty="0" smtClean="0"/>
-              <a:t>a high volume of signatures have low test data set frequencies.</a:t>
+              <a:t>, a high volume of signatures have low test data set frequencies.</a:t>
             </a:r>
           </a:p>
           <a:p>
@@ -5253,7 +5386,7 @@
       </p:grpSpPr>
       <p:sp>
         <p:nvSpPr>
-          <p:cNvPr id="12289" name="Title 1"/>
+          <p:cNvPr id="2" name="Title 1"/>
           <p:cNvSpPr>
             <a:spLocks noGrp="1"/>
           </p:cNvSpPr>
@@ -5261,93 +5394,59 @@
             <p:ph type="title"/>
           </p:nvPr>
         </p:nvSpPr>
-        <p:spPr>
-          <a:xfrm>
-            <a:off x="1477963" y="0"/>
-            <a:ext cx="9921875" cy="474663"/>
-          </a:xfrm>
-        </p:spPr>
+        <p:spPr/>
         <p:txBody>
           <a:bodyPr/>
           <a:lstStyle/>
           <a:p>
-            <a:pPr algn="ctr"/>
-            <a:r>
-              <a:rPr lang="en-US" altLang="en-US" sz="2400">
-                <a:latin typeface="Arial" charset="0"/>
-                <a:cs typeface="Arial" charset="0"/>
-              </a:rPr>
-              <a:t>Shared Analytic Pipeline Logical Architecture</a:t>
-            </a:r>
+            <a:r>
+              <a:rPr lang="en-US" dirty="0" smtClean="0"/>
+              <a:t>BIC Addressability vs Obligations</a:t>
+            </a:r>
+            <a:endParaRPr lang="en-US" dirty="0"/>
           </a:p>
         </p:txBody>
       </p:sp>
       <p:pic>
         <p:nvPicPr>
-          <p:cNvPr id="12290" name="Picture 8"/>
+          <p:cNvPr id="4" name="Picture 3"/>
           <p:cNvPicPr>
             <a:picLocks noChangeAspect="1"/>
           </p:cNvPicPr>
           <p:nvPr/>
         </p:nvPicPr>
         <p:blipFill>
-          <a:blip r:embed="rId3">
+          <a:blip r:embed="rId2">
             <a:extLst>
               <a:ext uri="{28A0092B-C50C-407E-A947-70E740481C1C}">
                 <a14:useLocalDpi xmlns:a14="http://schemas.microsoft.com/office/drawing/2010/main" val="0"/>
               </a:ext>
             </a:extLst>
           </a:blip>
-          <a:srcRect/>
           <a:stretch>
             <a:fillRect/>
           </a:stretch>
         </p:blipFill>
-        <p:spPr bwMode="auto">
+        <p:spPr>
           <a:xfrm>
-            <a:off x="0" y="382588"/>
-            <a:ext cx="12192000" cy="5802312"/>
+            <a:off x="1436543" y="1282968"/>
+            <a:ext cx="9318914" cy="4405313"/>
           </a:xfrm>
           <a:prstGeom prst="rect">
             <a:avLst/>
           </a:prstGeom>
-          <a:noFill/>
-          <a:ln>
-            <a:noFill/>
-          </a:ln>
-          <a:extLst>
-            <a:ext uri="{909E8E84-426E-40DD-AFC4-6F175D3DCCD1}">
-              <a14:hiddenFill xmlns:a14="http://schemas.microsoft.com/office/drawing/2010/main">
-                <a:solidFill>
-                  <a:srgbClr val="FFFFFF"/>
-                </a:solidFill>
-              </a14:hiddenFill>
-            </a:ext>
-            <a:ext uri="{91240B29-F687-4F45-9708-019B960494DF}">
-              <a14:hiddenLine xmlns:a14="http://schemas.microsoft.com/office/drawing/2010/main" w="9525">
-                <a:solidFill>
-                  <a:srgbClr val="000000"/>
-                </a:solidFill>
-                <a:miter lim="800000"/>
-                <a:headEnd/>
-                <a:tailEnd/>
-              </a14:hiddenLine>
-            </a:ext>
-          </a:extLst>
         </p:spPr>
       </p:pic>
     </p:spTree>
+    <p:extLst>
+      <p:ext uri="{BB962C8B-B14F-4D97-AF65-F5344CB8AC3E}">
+        <p14:creationId xmlns:p14="http://schemas.microsoft.com/office/powerpoint/2010/main" val="781273429"/>
+      </p:ext>
+    </p:extLst>
   </p:cSld>
   <p:clrMapOvr>
     <a:masterClrMapping/>
   </p:clrMapOvr>
-  <p:timing>
-    <p:tnLst>
-      <p:par>
-        <p:cTn id="1" dur="indefinite" restart="never" nodeType="tmRoot"/>
-      </p:par>
-    </p:tnLst>
-  </p:timing>
 </p:sld>
 </file>
 

</xml_diff>